<commit_message>
Update Capstone Design 2nd Presentation.pptx
</commit_message>
<xml_diff>
--- a/Weekly Presentation/Capstone Design 2nd Presentation.pptx
+++ b/Weekly Presentation/Capstone Design 2nd Presentation.pptx
@@ -303,7 +303,7 @@
           <a:p>
             <a:fld id="{22DC2647-C259-4EB5-84B8-93A3F8E54DE7}" type="datetimeFigureOut">
               <a:rPr lang="ko-KR" altLang="en-US" smtClean="0"/>
-              <a:t>2019-03-10</a:t>
+              <a:t>2019-03-17</a:t>
             </a:fld>
             <a:endParaRPr lang="ko-KR" altLang="en-US"/>
           </a:p>
@@ -402,7 +402,7 @@
           <a:p>
             <a:fld id="{B440BA11-FEDB-4E64-B4BE-9FDEE8123FE3}" type="datetimeFigureOut">
               <a:rPr lang="ko-KR" altLang="en-US" smtClean="0"/>
-              <a:t>2019-03-10</a:t>
+              <a:t>2019-03-17</a:t>
             </a:fld>
             <a:endParaRPr lang="ko-KR" altLang="en-US"/>
           </a:p>
@@ -800,7 +800,7 @@
           <a:p>
             <a:fld id="{8771C398-EBCC-4210-8AFD-1D056CED0821}" type="datetimeFigureOut">
               <a:rPr lang="ko-KR" altLang="en-US" smtClean="0"/>
-              <a:t>2019-03-10</a:t>
+              <a:t>2019-03-17</a:t>
             </a:fld>
             <a:endParaRPr lang="ko-KR" altLang="en-US"/>
           </a:p>
@@ -970,7 +970,7 @@
           <a:p>
             <a:fld id="{8771C398-EBCC-4210-8AFD-1D056CED0821}" type="datetimeFigureOut">
               <a:rPr lang="ko-KR" altLang="en-US" smtClean="0"/>
-              <a:t>2019-03-10</a:t>
+              <a:t>2019-03-17</a:t>
             </a:fld>
             <a:endParaRPr lang="ko-KR" altLang="en-US"/>
           </a:p>
@@ -1150,7 +1150,7 @@
           <a:p>
             <a:fld id="{8771C398-EBCC-4210-8AFD-1D056CED0821}" type="datetimeFigureOut">
               <a:rPr lang="ko-KR" altLang="en-US" smtClean="0"/>
-              <a:t>2019-03-10</a:t>
+              <a:t>2019-03-17</a:t>
             </a:fld>
             <a:endParaRPr lang="ko-KR" altLang="en-US"/>
           </a:p>
@@ -1320,7 +1320,7 @@
           <a:p>
             <a:fld id="{8771C398-EBCC-4210-8AFD-1D056CED0821}" type="datetimeFigureOut">
               <a:rPr lang="ko-KR" altLang="en-US" smtClean="0"/>
-              <a:t>2019-03-10</a:t>
+              <a:t>2019-03-17</a:t>
             </a:fld>
             <a:endParaRPr lang="ko-KR" altLang="en-US"/>
           </a:p>
@@ -1566,7 +1566,7 @@
           <a:p>
             <a:fld id="{8771C398-EBCC-4210-8AFD-1D056CED0821}" type="datetimeFigureOut">
               <a:rPr lang="ko-KR" altLang="en-US" smtClean="0"/>
-              <a:t>2019-03-10</a:t>
+              <a:t>2019-03-17</a:t>
             </a:fld>
             <a:endParaRPr lang="ko-KR" altLang="en-US"/>
           </a:p>
@@ -1798,7 +1798,7 @@
           <a:p>
             <a:fld id="{8771C398-EBCC-4210-8AFD-1D056CED0821}" type="datetimeFigureOut">
               <a:rPr lang="ko-KR" altLang="en-US" smtClean="0"/>
-              <a:t>2019-03-10</a:t>
+              <a:t>2019-03-17</a:t>
             </a:fld>
             <a:endParaRPr lang="ko-KR" altLang="en-US"/>
           </a:p>
@@ -2165,7 +2165,7 @@
           <a:p>
             <a:fld id="{8771C398-EBCC-4210-8AFD-1D056CED0821}" type="datetimeFigureOut">
               <a:rPr lang="ko-KR" altLang="en-US" smtClean="0"/>
-              <a:t>2019-03-10</a:t>
+              <a:t>2019-03-17</a:t>
             </a:fld>
             <a:endParaRPr lang="ko-KR" altLang="en-US"/>
           </a:p>
@@ -2283,7 +2283,7 @@
           <a:p>
             <a:fld id="{8771C398-EBCC-4210-8AFD-1D056CED0821}" type="datetimeFigureOut">
               <a:rPr lang="ko-KR" altLang="en-US" smtClean="0"/>
-              <a:t>2019-03-10</a:t>
+              <a:t>2019-03-17</a:t>
             </a:fld>
             <a:endParaRPr lang="ko-KR" altLang="en-US"/>
           </a:p>
@@ -2378,7 +2378,7 @@
           <a:p>
             <a:fld id="{8771C398-EBCC-4210-8AFD-1D056CED0821}" type="datetimeFigureOut">
               <a:rPr lang="ko-KR" altLang="en-US" smtClean="0"/>
-              <a:t>2019-03-10</a:t>
+              <a:t>2019-03-17</a:t>
             </a:fld>
             <a:endParaRPr lang="ko-KR" altLang="en-US"/>
           </a:p>
@@ -2655,7 +2655,7 @@
           <a:p>
             <a:fld id="{8771C398-EBCC-4210-8AFD-1D056CED0821}" type="datetimeFigureOut">
               <a:rPr lang="ko-KR" altLang="en-US" smtClean="0"/>
-              <a:t>2019-03-10</a:t>
+              <a:t>2019-03-17</a:t>
             </a:fld>
             <a:endParaRPr lang="ko-KR" altLang="en-US"/>
           </a:p>
@@ -2912,7 +2912,7 @@
           <a:p>
             <a:fld id="{8771C398-EBCC-4210-8AFD-1D056CED0821}" type="datetimeFigureOut">
               <a:rPr lang="ko-KR" altLang="en-US" smtClean="0"/>
-              <a:t>2019-03-10</a:t>
+              <a:t>2019-03-17</a:t>
             </a:fld>
             <a:endParaRPr lang="ko-KR" altLang="en-US"/>
           </a:p>
@@ -3128,7 +3128,7 @@
           <a:p>
             <a:fld id="{8771C398-EBCC-4210-8AFD-1D056CED0821}" type="datetimeFigureOut">
               <a:rPr lang="ko-KR" altLang="en-US" smtClean="0"/>
-              <a:t>2019-03-10</a:t>
+              <a:t>2019-03-17</a:t>
             </a:fld>
             <a:endParaRPr lang="ko-KR" altLang="en-US"/>
           </a:p>
@@ -6708,7 +6708,7 @@
             <a:pPr algn="ctr"/>
             <a:r>
               <a:rPr lang="en-US" altLang="ko-KR" sz="1500" dirty="0"/>
-              <a:t>Collect Running Datasets</a:t>
+              <a:t>Collect Learning Datasets</a:t>
             </a:r>
           </a:p>
           <a:p>
@@ -6774,7 +6774,7 @@
             <a:pPr algn="ctr"/>
             <a:r>
               <a:rPr lang="en-US" altLang="ko-KR" sz="1500" dirty="0"/>
-              <a:t>Collecting Running Datasets</a:t>
+              <a:t>Collecting Learning Datasets</a:t>
             </a:r>
           </a:p>
           <a:p>
@@ -6839,8 +6839,12 @@
           <a:p>
             <a:pPr algn="ctr"/>
             <a:r>
+              <a:rPr lang="en-US" altLang="ko-KR" sz="1500"/>
+              <a:t>Collecting Learning </a:t>
+            </a:r>
+            <a:r>
               <a:rPr lang="en-US" altLang="ko-KR" sz="1500" dirty="0"/>
-              <a:t>Collecting Running Datasets</a:t>
+              <a:t>Datasets</a:t>
             </a:r>
           </a:p>
           <a:p>

</xml_diff>